<commit_message>
adding all functions, no doc, no tests
</commit_message>
<xml_diff>
--- a/Task2/Programm_Sketch_Tobias.pptx
+++ b/Task2/Programm_Sketch_Tobias.pptx
@@ -8,6 +8,8 @@
     <p:sldId id="256" r:id="rId2"/>
     <p:sldId id="257" r:id="rId3"/>
     <p:sldId id="258" r:id="rId4"/>
+    <p:sldId id="259" r:id="rId5"/>
+    <p:sldId id="260" r:id="rId6"/>
   </p:sldIdLst>
   <p:sldSz cx="12192000" cy="6858000"/>
   <p:notesSz cx="6858000" cy="9144000"/>
@@ -117,7 +119,7 @@
 <file path=ppt/revisionInfo.xml><?xml version="1.0" encoding="utf-8"?>
 <p1510:revInfo xmlns:a="http://schemas.openxmlformats.org/drawingml/2006/main" xmlns:r="http://schemas.openxmlformats.org/officeDocument/2006/relationships" xmlns:p1510="http://schemas.microsoft.com/office/powerpoint/2015/10/main">
   <p1510:revLst>
-    <p1510:client id="{3C106064-9E4C-4285-B67C-E571D06FB714}" v="4" dt="2021-03-18T10:05:11.238"/>
+    <p1510:client id="{3C106064-9E4C-4285-B67C-E571D06FB714}" v="12" dt="2021-03-18T12:16:29.997"/>
   </p1510:revLst>
 </p1510:revInfo>
 </file>
@@ -127,7 +129,7 @@
   <pc:docChgLst>
     <pc:chgData name="Tobias 1x1" userId="5182d9ac6a9b2d81" providerId="LiveId" clId="{3C106064-9E4C-4285-B67C-E571D06FB714}"/>
     <pc:docChg chg="undo custSel addSld modSld">
-      <pc:chgData name="Tobias 1x1" userId="5182d9ac6a9b2d81" providerId="LiveId" clId="{3C106064-9E4C-4285-B67C-E571D06FB714}" dt="2021-03-18T11:07:26.839" v="511" actId="1076"/>
+      <pc:chgData name="Tobias 1x1" userId="5182d9ac6a9b2d81" providerId="LiveId" clId="{3C106064-9E4C-4285-B67C-E571D06FB714}" dt="2021-03-18T12:28:42.750" v="904" actId="1076"/>
       <pc:docMkLst>
         <pc:docMk/>
       </pc:docMkLst>
@@ -171,7 +173,7 @@
         </pc:spChg>
       </pc:sldChg>
       <pc:sldChg chg="addSp delSp modSp new mod">
-        <pc:chgData name="Tobias 1x1" userId="5182d9ac6a9b2d81" providerId="LiveId" clId="{3C106064-9E4C-4285-B67C-E571D06FB714}" dt="2021-03-18T11:07:26.839" v="511" actId="1076"/>
+        <pc:chgData name="Tobias 1x1" userId="5182d9ac6a9b2d81" providerId="LiveId" clId="{3C106064-9E4C-4285-B67C-E571D06FB714}" dt="2021-03-18T12:28:42.750" v="904" actId="1076"/>
         <pc:sldMkLst>
           <pc:docMk/>
           <pc:sldMk cId="333864021" sldId="258"/>
@@ -209,7 +211,7 @@
           </ac:spMkLst>
         </pc:spChg>
         <pc:grpChg chg="add mod">
-          <ac:chgData name="Tobias 1x1" userId="5182d9ac6a9b2d81" providerId="LiveId" clId="{3C106064-9E4C-4285-B67C-E571D06FB714}" dt="2021-03-18T11:07:26.839" v="511" actId="1076"/>
+          <ac:chgData name="Tobias 1x1" userId="5182d9ac6a9b2d81" providerId="LiveId" clId="{3C106064-9E4C-4285-B67C-E571D06FB714}" dt="2021-03-18T12:28:42.750" v="904" actId="1076"/>
           <ac:grpSpMkLst>
             <pc:docMk/>
             <pc:sldMk cId="333864021" sldId="258"/>
@@ -224,6 +226,124 @@
             <ac:cxnSpMk id="7" creationId="{2849FD8A-C6D9-4B8C-BC4B-782C54F5925F}"/>
           </ac:cxnSpMkLst>
         </pc:cxnChg>
+      </pc:sldChg>
+      <pc:sldChg chg="addSp delSp modSp new mod">
+        <pc:chgData name="Tobias 1x1" userId="5182d9ac6a9b2d81" providerId="LiveId" clId="{3C106064-9E4C-4285-B67C-E571D06FB714}" dt="2021-03-18T12:11:30.410" v="620" actId="1076"/>
+        <pc:sldMkLst>
+          <pc:docMk/>
+          <pc:sldMk cId="4251053872" sldId="259"/>
+        </pc:sldMkLst>
+        <pc:spChg chg="del">
+          <ac:chgData name="Tobias 1x1" userId="5182d9ac6a9b2d81" providerId="LiveId" clId="{3C106064-9E4C-4285-B67C-E571D06FB714}" dt="2021-03-18T12:02:57.204" v="514" actId="478"/>
+          <ac:spMkLst>
+            <pc:docMk/>
+            <pc:sldMk cId="4251053872" sldId="259"/>
+            <ac:spMk id="2" creationId="{319AEFEB-8873-4F8C-8EB1-9FAB1ACDA637}"/>
+          </ac:spMkLst>
+        </pc:spChg>
+        <pc:spChg chg="del">
+          <ac:chgData name="Tobias 1x1" userId="5182d9ac6a9b2d81" providerId="LiveId" clId="{3C106064-9E4C-4285-B67C-E571D06FB714}" dt="2021-03-18T12:02:55.779" v="513" actId="478"/>
+          <ac:spMkLst>
+            <pc:docMk/>
+            <pc:sldMk cId="4251053872" sldId="259"/>
+            <ac:spMk id="3" creationId="{55099023-8F92-474C-AF76-FA785D7B4BD5}"/>
+          </ac:spMkLst>
+        </pc:spChg>
+        <pc:spChg chg="add mod">
+          <ac:chgData name="Tobias 1x1" userId="5182d9ac6a9b2d81" providerId="LiveId" clId="{3C106064-9E4C-4285-B67C-E571D06FB714}" dt="2021-03-18T12:04:17.182" v="537" actId="164"/>
+          <ac:spMkLst>
+            <pc:docMk/>
+            <pc:sldMk cId="4251053872" sldId="259"/>
+            <ac:spMk id="4" creationId="{DC24EB38-BAF0-4EDF-BBBF-6EF067FC1E76}"/>
+          </ac:spMkLst>
+        </pc:spChg>
+        <pc:spChg chg="add mod">
+          <ac:chgData name="Tobias 1x1" userId="5182d9ac6a9b2d81" providerId="LiveId" clId="{3C106064-9E4C-4285-B67C-E571D06FB714}" dt="2021-03-18T12:10:54.437" v="613" actId="20577"/>
+          <ac:spMkLst>
+            <pc:docMk/>
+            <pc:sldMk cId="4251053872" sldId="259"/>
+            <ac:spMk id="7" creationId="{44169101-FE7E-4885-8C22-45082C8F9453}"/>
+          </ac:spMkLst>
+        </pc:spChg>
+        <pc:spChg chg="add mod">
+          <ac:chgData name="Tobias 1x1" userId="5182d9ac6a9b2d81" providerId="LiveId" clId="{3C106064-9E4C-4285-B67C-E571D06FB714}" dt="2021-03-18T12:10:43.144" v="611" actId="20577"/>
+          <ac:spMkLst>
+            <pc:docMk/>
+            <pc:sldMk cId="4251053872" sldId="259"/>
+            <ac:spMk id="11" creationId="{9DE657DA-0256-45F5-8C15-043455076EBD}"/>
+          </ac:spMkLst>
+        </pc:spChg>
+        <pc:spChg chg="add del mod">
+          <ac:chgData name="Tobias 1x1" userId="5182d9ac6a9b2d81" providerId="LiveId" clId="{3C106064-9E4C-4285-B67C-E571D06FB714}" dt="2021-03-18T12:10:02.481" v="597" actId="478"/>
+          <ac:spMkLst>
+            <pc:docMk/>
+            <pc:sldMk cId="4251053872" sldId="259"/>
+            <ac:spMk id="12" creationId="{C198F42A-28B2-4516-9807-EA0EA5F39ED7}"/>
+          </ac:spMkLst>
+        </pc:spChg>
+        <pc:spChg chg="add mod">
+          <ac:chgData name="Tobias 1x1" userId="5182d9ac6a9b2d81" providerId="LiveId" clId="{3C106064-9E4C-4285-B67C-E571D06FB714}" dt="2021-03-18T12:11:00.661" v="617" actId="20577"/>
+          <ac:spMkLst>
+            <pc:docMk/>
+            <pc:sldMk cId="4251053872" sldId="259"/>
+            <ac:spMk id="13" creationId="{F30724D0-ABB2-46BE-B5A7-E716DB978E4F}"/>
+          </ac:spMkLst>
+        </pc:spChg>
+        <pc:spChg chg="add mod">
+          <ac:chgData name="Tobias 1x1" userId="5182d9ac6a9b2d81" providerId="LiveId" clId="{3C106064-9E4C-4285-B67C-E571D06FB714}" dt="2021-03-18T12:11:30.410" v="620" actId="1076"/>
+          <ac:spMkLst>
+            <pc:docMk/>
+            <pc:sldMk cId="4251053872" sldId="259"/>
+            <ac:spMk id="14" creationId="{E1D16606-C1F1-4E81-8D70-424001D835C7}"/>
+          </ac:spMkLst>
+        </pc:spChg>
+        <pc:grpChg chg="add mod">
+          <ac:chgData name="Tobias 1x1" userId="5182d9ac6a9b2d81" providerId="LiveId" clId="{3C106064-9E4C-4285-B67C-E571D06FB714}" dt="2021-03-18T12:10:06.632" v="598" actId="1076"/>
+          <ac:grpSpMkLst>
+            <pc:docMk/>
+            <pc:sldMk cId="4251053872" sldId="259"/>
+            <ac:grpSpMk id="10" creationId="{80940F32-4DF2-4845-A20C-666F5F1E8230}"/>
+          </ac:grpSpMkLst>
+        </pc:grpChg>
+        <pc:cxnChg chg="add mod">
+          <ac:chgData name="Tobias 1x1" userId="5182d9ac6a9b2d81" providerId="LiveId" clId="{3C106064-9E4C-4285-B67C-E571D06FB714}" dt="2021-03-18T12:04:17.182" v="537" actId="164"/>
+          <ac:cxnSpMkLst>
+            <pc:docMk/>
+            <pc:sldMk cId="4251053872" sldId="259"/>
+            <ac:cxnSpMk id="6" creationId="{3F2BB3CA-2D72-40D0-93FC-68412892CE24}"/>
+          </ac:cxnSpMkLst>
+        </pc:cxnChg>
+      </pc:sldChg>
+      <pc:sldChg chg="addSp modSp new mod">
+        <pc:chgData name="Tobias 1x1" userId="5182d9ac6a9b2d81" providerId="LiveId" clId="{3C106064-9E4C-4285-B67C-E571D06FB714}" dt="2021-03-18T12:19:40.796" v="903" actId="20577"/>
+        <pc:sldMkLst>
+          <pc:docMk/>
+          <pc:sldMk cId="3872315283" sldId="260"/>
+        </pc:sldMkLst>
+        <pc:spChg chg="mod">
+          <ac:chgData name="Tobias 1x1" userId="5182d9ac6a9b2d81" providerId="LiveId" clId="{3C106064-9E4C-4285-B67C-E571D06FB714}" dt="2021-03-18T12:14:19.940" v="679" actId="20577"/>
+          <ac:spMkLst>
+            <pc:docMk/>
+            <pc:sldMk cId="3872315283" sldId="260"/>
+            <ac:spMk id="2" creationId="{9A596B7B-A665-49DA-97B3-F83877570DF6}"/>
+          </ac:spMkLst>
+        </pc:spChg>
+        <pc:spChg chg="mod">
+          <ac:chgData name="Tobias 1x1" userId="5182d9ac6a9b2d81" providerId="LiveId" clId="{3C106064-9E4C-4285-B67C-E571D06FB714}" dt="2021-03-18T12:19:28.397" v="889" actId="20577"/>
+          <ac:spMkLst>
+            <pc:docMk/>
+            <pc:sldMk cId="3872315283" sldId="260"/>
+            <ac:spMk id="3" creationId="{970FB69D-A0A1-453C-83A3-D351BCE41B97}"/>
+          </ac:spMkLst>
+        </pc:spChg>
+        <pc:spChg chg="add mod">
+          <ac:chgData name="Tobias 1x1" userId="5182d9ac6a9b2d81" providerId="LiveId" clId="{3C106064-9E4C-4285-B67C-E571D06FB714}" dt="2021-03-18T12:19:40.796" v="903" actId="20577"/>
+          <ac:spMkLst>
+            <pc:docMk/>
+            <pc:sldMk cId="3872315283" sldId="260"/>
+            <ac:spMk id="4" creationId="{D08601A4-46F3-4588-AF2E-0789D38798D8}"/>
+          </ac:spMkLst>
+        </pc:spChg>
       </pc:sldChg>
     </pc:docChg>
   </pc:docChgLst>
@@ -4644,7 +4764,7 @@
         </p:nvGrpSpPr>
         <p:grpSpPr>
           <a:xfrm>
-            <a:off x="1970899" y="575208"/>
+            <a:off x="1970899" y="482930"/>
             <a:ext cx="8250202" cy="4612934"/>
             <a:chOff x="1170635" y="1758057"/>
             <a:chExt cx="8250202" cy="4612934"/>
@@ -5538,6 +5658,685 @@
     <p:extLst>
       <p:ext uri="{BB962C8B-B14F-4D97-AF65-F5344CB8AC3E}">
         <p14:creationId xmlns:p14="http://schemas.microsoft.com/office/powerpoint/2010/main" val="333864021"/>
+      </p:ext>
+    </p:extLst>
+  </p:cSld>
+  <p:clrMapOvr>
+    <a:masterClrMapping/>
+  </p:clrMapOvr>
+</p:sld>
+</file>
+
+<file path=ppt/slides/slide4.xml><?xml version="1.0" encoding="utf-8"?>
+<p:sld xmlns:a="http://schemas.openxmlformats.org/drawingml/2006/main" xmlns:r="http://schemas.openxmlformats.org/officeDocument/2006/relationships" xmlns:p="http://schemas.openxmlformats.org/presentationml/2006/main">
+  <p:cSld>
+    <p:spTree>
+      <p:nvGrpSpPr>
+        <p:cNvPr id="1" name=""/>
+        <p:cNvGrpSpPr/>
+        <p:nvPr/>
+      </p:nvGrpSpPr>
+      <p:grpSpPr>
+        <a:xfrm>
+          <a:off x="0" y="0"/>
+          <a:ext cx="0" cy="0"/>
+          <a:chOff x="0" y="0"/>
+          <a:chExt cx="0" cy="0"/>
+        </a:xfrm>
+      </p:grpSpPr>
+      <p:grpSp>
+        <p:nvGrpSpPr>
+          <p:cNvPr id="10" name="Gruppieren 9">
+            <a:extLst>
+              <a:ext uri="{FF2B5EF4-FFF2-40B4-BE49-F238E27FC236}">
+                <a16:creationId xmlns:a16="http://schemas.microsoft.com/office/drawing/2014/main" id="{80940F32-4DF2-4845-A20C-666F5F1E8230}"/>
+              </a:ext>
+            </a:extLst>
+          </p:cNvPr>
+          <p:cNvGrpSpPr/>
+          <p:nvPr/>
+        </p:nvGrpSpPr>
+        <p:grpSpPr>
+          <a:xfrm>
+            <a:off x="839085" y="499706"/>
+            <a:ext cx="3237965" cy="1415578"/>
+            <a:chOff x="3590674" y="902379"/>
+            <a:chExt cx="3237965" cy="1415578"/>
+          </a:xfrm>
+        </p:grpSpPr>
+        <p:sp>
+          <p:nvSpPr>
+            <p:cNvPr id="4" name="Textfeld 3">
+              <a:extLst>
+                <a:ext uri="{FF2B5EF4-FFF2-40B4-BE49-F238E27FC236}">
+                  <a16:creationId xmlns:a16="http://schemas.microsoft.com/office/drawing/2014/main" id="{DC24EB38-BAF0-4EDF-BBBF-6EF067FC1E76}"/>
+                </a:ext>
+              </a:extLst>
+            </p:cNvPr>
+            <p:cNvSpPr txBox="1"/>
+            <p:nvPr/>
+          </p:nvSpPr>
+          <p:spPr>
+            <a:xfrm>
+              <a:off x="3590674" y="902379"/>
+              <a:ext cx="3237965" cy="369332"/>
+            </a:xfrm>
+            <a:prstGeom prst="rect">
+              <a:avLst/>
+            </a:prstGeom>
+            <a:noFill/>
+            <a:ln w="19050" cap="flat" cmpd="sng" algn="ctr">
+              <a:solidFill>
+                <a:schemeClr val="accent1"/>
+              </a:solidFill>
+              <a:prstDash val="solid"/>
+              <a:round/>
+              <a:headEnd type="none" w="med" len="med"/>
+              <a:tailEnd type="none" w="med" len="med"/>
+            </a:ln>
+          </p:spPr>
+          <p:style>
+            <a:lnRef idx="0">
+              <a:scrgbClr r="0" g="0" b="0"/>
+            </a:lnRef>
+            <a:fillRef idx="0">
+              <a:scrgbClr r="0" g="0" b="0"/>
+            </a:fillRef>
+            <a:effectRef idx="0">
+              <a:scrgbClr r="0" g="0" b="0"/>
+            </a:effectRef>
+            <a:fontRef idx="minor">
+              <a:schemeClr val="accent1"/>
+            </a:fontRef>
+          </p:style>
+          <p:txBody>
+            <a:bodyPr wrap="square" rtlCol="0">
+              <a:spAutoFit/>
+            </a:bodyPr>
+            <a:lstStyle/>
+            <a:p>
+              <a:r>
+                <a:rPr lang="de-DE" b="1" dirty="0"/>
+                <a:t>Reader</a:t>
+              </a:r>
+            </a:p>
+          </p:txBody>
+        </p:sp>
+        <p:cxnSp>
+          <p:nvCxnSpPr>
+            <p:cNvPr id="6" name="Gerade Verbindung mit Pfeil 5">
+              <a:extLst>
+                <a:ext uri="{FF2B5EF4-FFF2-40B4-BE49-F238E27FC236}">
+                  <a16:creationId xmlns:a16="http://schemas.microsoft.com/office/drawing/2014/main" id="{3F2BB3CA-2D72-40D0-93FC-68412892CE24}"/>
+                </a:ext>
+              </a:extLst>
+            </p:cNvPr>
+            <p:cNvCxnSpPr>
+              <a:cxnSpLocks/>
+              <a:stCxn id="4" idx="2"/>
+            </p:cNvCxnSpPr>
+            <p:nvPr/>
+          </p:nvCxnSpPr>
+          <p:spPr>
+            <a:xfrm>
+              <a:off x="5209657" y="1271711"/>
+              <a:ext cx="0" cy="666146"/>
+            </a:xfrm>
+            <a:prstGeom prst="straightConnector1">
+              <a:avLst/>
+            </a:prstGeom>
+            <a:ln>
+              <a:tailEnd type="triangle"/>
+            </a:ln>
+          </p:spPr>
+          <p:style>
+            <a:lnRef idx="1">
+              <a:schemeClr val="dk1"/>
+            </a:lnRef>
+            <a:fillRef idx="0">
+              <a:schemeClr val="dk1"/>
+            </a:fillRef>
+            <a:effectRef idx="0">
+              <a:schemeClr val="dk1"/>
+            </a:effectRef>
+            <a:fontRef idx="minor">
+              <a:schemeClr val="tx1"/>
+            </a:fontRef>
+          </p:style>
+        </p:cxnSp>
+        <p:sp>
+          <p:nvSpPr>
+            <p:cNvPr id="7" name="Textfeld 6">
+              <a:extLst>
+                <a:ext uri="{FF2B5EF4-FFF2-40B4-BE49-F238E27FC236}">
+                  <a16:creationId xmlns:a16="http://schemas.microsoft.com/office/drawing/2014/main" id="{44169101-FE7E-4885-8C22-45082C8F9453}"/>
+                </a:ext>
+              </a:extLst>
+            </p:cNvPr>
+            <p:cNvSpPr txBox="1"/>
+            <p:nvPr/>
+          </p:nvSpPr>
+          <p:spPr>
+            <a:xfrm>
+              <a:off x="3590674" y="1948625"/>
+              <a:ext cx="3237958" cy="369332"/>
+            </a:xfrm>
+            <a:prstGeom prst="rect">
+              <a:avLst/>
+            </a:prstGeom>
+            <a:noFill/>
+            <a:ln w="19050" cap="flat" cmpd="sng" algn="ctr">
+              <a:solidFill>
+                <a:schemeClr val="accent1"/>
+              </a:solidFill>
+              <a:prstDash val="solid"/>
+              <a:round/>
+              <a:headEnd type="none" w="med" len="med"/>
+              <a:tailEnd type="none" w="med" len="med"/>
+            </a:ln>
+          </p:spPr>
+          <p:style>
+            <a:lnRef idx="0">
+              <a:scrgbClr r="0" g="0" b="0"/>
+            </a:lnRef>
+            <a:fillRef idx="0">
+              <a:scrgbClr r="0" g="0" b="0"/>
+            </a:fillRef>
+            <a:effectRef idx="0">
+              <a:scrgbClr r="0" g="0" b="0"/>
+            </a:effectRef>
+            <a:fontRef idx="minor">
+              <a:schemeClr val="accent1"/>
+            </a:fontRef>
+          </p:style>
+          <p:txBody>
+            <a:bodyPr wrap="square" rtlCol="0">
+              <a:spAutoFit/>
+            </a:bodyPr>
+            <a:lstStyle/>
+            <a:p>
+              <a:r>
+                <a:rPr lang="de-DE" b="1" dirty="0"/>
+                <a:t>Analyse 1</a:t>
+              </a:r>
+            </a:p>
+          </p:txBody>
+        </p:sp>
+      </p:grpSp>
+      <p:sp>
+        <p:nvSpPr>
+          <p:cNvPr id="11" name="Textfeld 10">
+            <a:extLst>
+              <a:ext uri="{FF2B5EF4-FFF2-40B4-BE49-F238E27FC236}">
+                <a16:creationId xmlns:a16="http://schemas.microsoft.com/office/drawing/2014/main" id="{9DE657DA-0256-45F5-8C15-043455076EBD}"/>
+              </a:ext>
+            </a:extLst>
+          </p:cNvPr>
+          <p:cNvSpPr txBox="1"/>
+          <p:nvPr/>
+        </p:nvSpPr>
+        <p:spPr>
+          <a:xfrm>
+            <a:off x="2558642" y="986570"/>
+            <a:ext cx="1382045" cy="369332"/>
+          </a:xfrm>
+          <a:prstGeom prst="rect">
+            <a:avLst/>
+          </a:prstGeom>
+          <a:noFill/>
+        </p:spPr>
+        <p:txBody>
+          <a:bodyPr wrap="none" rtlCol="0">
+            <a:spAutoFit/>
+          </a:bodyPr>
+          <a:lstStyle/>
+          <a:p>
+            <a:r>
+              <a:rPr lang="de-DE" dirty="0"/>
+              <a:t>1 </a:t>
+            </a:r>
+            <a:r>
+              <a:rPr lang="de-DE" dirty="0" err="1"/>
+              <a:t>DataFrame</a:t>
+            </a:r>
+            <a:endParaRPr lang="de-DE" dirty="0"/>
+          </a:p>
+        </p:txBody>
+      </p:sp>
+      <p:sp>
+        <p:nvSpPr>
+          <p:cNvPr id="13" name="Textfeld 12">
+            <a:extLst>
+              <a:ext uri="{FF2B5EF4-FFF2-40B4-BE49-F238E27FC236}">
+                <a16:creationId xmlns:a16="http://schemas.microsoft.com/office/drawing/2014/main" id="{F30724D0-ABB2-46BE-B5A7-E716DB978E4F}"/>
+              </a:ext>
+            </a:extLst>
+          </p:cNvPr>
+          <p:cNvSpPr txBox="1"/>
+          <p:nvPr/>
+        </p:nvSpPr>
+        <p:spPr>
+          <a:xfrm>
+            <a:off x="4338692" y="1545952"/>
+            <a:ext cx="3237958" cy="369332"/>
+          </a:xfrm>
+          <a:prstGeom prst="rect">
+            <a:avLst/>
+          </a:prstGeom>
+          <a:noFill/>
+          <a:ln w="19050" cap="flat" cmpd="sng" algn="ctr">
+            <a:solidFill>
+              <a:schemeClr val="accent1"/>
+            </a:solidFill>
+            <a:prstDash val="solid"/>
+            <a:round/>
+            <a:headEnd type="none" w="med" len="med"/>
+            <a:tailEnd type="none" w="med" len="med"/>
+          </a:ln>
+        </p:spPr>
+        <p:style>
+          <a:lnRef idx="0">
+            <a:scrgbClr r="0" g="0" b="0"/>
+          </a:lnRef>
+          <a:fillRef idx="0">
+            <a:scrgbClr r="0" g="0" b="0"/>
+          </a:fillRef>
+          <a:effectRef idx="0">
+            <a:scrgbClr r="0" g="0" b="0"/>
+          </a:effectRef>
+          <a:fontRef idx="minor">
+            <a:schemeClr val="accent1"/>
+          </a:fontRef>
+        </p:style>
+        <p:txBody>
+          <a:bodyPr wrap="square" rtlCol="0">
+            <a:spAutoFit/>
+          </a:bodyPr>
+          <a:lstStyle/>
+          <a:p>
+            <a:r>
+              <a:rPr lang="de-DE" b="1" dirty="0"/>
+              <a:t>Analyse 2</a:t>
+            </a:r>
+          </a:p>
+        </p:txBody>
+      </p:sp>
+      <p:sp>
+        <p:nvSpPr>
+          <p:cNvPr id="14" name="Textfeld 13">
+            <a:extLst>
+              <a:ext uri="{FF2B5EF4-FFF2-40B4-BE49-F238E27FC236}">
+                <a16:creationId xmlns:a16="http://schemas.microsoft.com/office/drawing/2014/main" id="{E1D16606-C1F1-4E81-8D70-424001D835C7}"/>
+              </a:ext>
+            </a:extLst>
+          </p:cNvPr>
+          <p:cNvSpPr txBox="1"/>
+          <p:nvPr/>
+        </p:nvSpPr>
+        <p:spPr>
+          <a:xfrm>
+            <a:off x="5266648" y="1017445"/>
+            <a:ext cx="1382045" cy="369332"/>
+          </a:xfrm>
+          <a:prstGeom prst="rect">
+            <a:avLst/>
+          </a:prstGeom>
+          <a:noFill/>
+        </p:spPr>
+        <p:txBody>
+          <a:bodyPr wrap="none" rtlCol="0">
+            <a:spAutoFit/>
+          </a:bodyPr>
+          <a:lstStyle/>
+          <a:p>
+            <a:r>
+              <a:rPr lang="de-DE" dirty="0"/>
+              <a:t>1 </a:t>
+            </a:r>
+            <a:r>
+              <a:rPr lang="de-DE" dirty="0" err="1"/>
+              <a:t>DataFrame</a:t>
+            </a:r>
+            <a:endParaRPr lang="de-DE" dirty="0"/>
+          </a:p>
+        </p:txBody>
+      </p:sp>
+    </p:spTree>
+    <p:extLst>
+      <p:ext uri="{BB962C8B-B14F-4D97-AF65-F5344CB8AC3E}">
+        <p14:creationId xmlns:p14="http://schemas.microsoft.com/office/powerpoint/2010/main" val="4251053872"/>
+      </p:ext>
+    </p:extLst>
+  </p:cSld>
+  <p:clrMapOvr>
+    <a:masterClrMapping/>
+  </p:clrMapOvr>
+</p:sld>
+</file>
+
+<file path=ppt/slides/slide5.xml><?xml version="1.0" encoding="utf-8"?>
+<p:sld xmlns:a="http://schemas.openxmlformats.org/drawingml/2006/main" xmlns:r="http://schemas.openxmlformats.org/officeDocument/2006/relationships" xmlns:p="http://schemas.openxmlformats.org/presentationml/2006/main">
+  <p:cSld>
+    <p:spTree>
+      <p:nvGrpSpPr>
+        <p:cNvPr id="1" name=""/>
+        <p:cNvGrpSpPr/>
+        <p:nvPr/>
+      </p:nvGrpSpPr>
+      <p:grpSpPr>
+        <a:xfrm>
+          <a:off x="0" y="0"/>
+          <a:ext cx="0" cy="0"/>
+          <a:chOff x="0" y="0"/>
+          <a:chExt cx="0" cy="0"/>
+        </a:xfrm>
+      </p:grpSpPr>
+      <p:sp>
+        <p:nvSpPr>
+          <p:cNvPr id="2" name="Titel 1">
+            <a:extLst>
+              <a:ext uri="{FF2B5EF4-FFF2-40B4-BE49-F238E27FC236}">
+                <a16:creationId xmlns:a16="http://schemas.microsoft.com/office/drawing/2014/main" id="{9A596B7B-A665-49DA-97B3-F83877570DF6}"/>
+              </a:ext>
+            </a:extLst>
+          </p:cNvPr>
+          <p:cNvSpPr>
+            <a:spLocks noGrp="1"/>
+          </p:cNvSpPr>
+          <p:nvPr>
+            <p:ph type="title"/>
+          </p:nvPr>
+        </p:nvSpPr>
+        <p:spPr/>
+        <p:txBody>
+          <a:bodyPr/>
+          <a:lstStyle/>
+          <a:p>
+            <a:r>
+              <a:rPr lang="de-DE" dirty="0"/>
+              <a:t>Analysis Class (</a:t>
+            </a:r>
+            <a:r>
+              <a:rPr lang="de-DE" dirty="0" err="1"/>
+              <a:t>DataFrame</a:t>
+            </a:r>
+            <a:r>
+              <a:rPr lang="de-DE" dirty="0"/>
+              <a:t>)</a:t>
+            </a:r>
+          </a:p>
+        </p:txBody>
+      </p:sp>
+      <p:sp>
+        <p:nvSpPr>
+          <p:cNvPr id="3" name="Inhaltsplatzhalter 2">
+            <a:extLst>
+              <a:ext uri="{FF2B5EF4-FFF2-40B4-BE49-F238E27FC236}">
+                <a16:creationId xmlns:a16="http://schemas.microsoft.com/office/drawing/2014/main" id="{970FB69D-A0A1-453C-83A3-D351BCE41B97}"/>
+              </a:ext>
+            </a:extLst>
+          </p:cNvPr>
+          <p:cNvSpPr>
+            <a:spLocks noGrp="1"/>
+          </p:cNvSpPr>
+          <p:nvPr>
+            <p:ph idx="1"/>
+          </p:nvPr>
+        </p:nvSpPr>
+        <p:spPr/>
+        <p:txBody>
+          <a:bodyPr/>
+          <a:lstStyle/>
+          <a:p>
+            <a:r>
+              <a:rPr lang="de-DE" dirty="0" err="1"/>
+              <a:t>Variance</a:t>
+            </a:r>
+            <a:r>
+              <a:rPr lang="de-DE" dirty="0"/>
+              <a:t> </a:t>
+            </a:r>
+            <a:r>
+              <a:rPr lang="de-DE" dirty="0" err="1"/>
+              <a:t>threshold</a:t>
+            </a:r>
+            <a:r>
+              <a:rPr lang="de-DE" dirty="0"/>
+              <a:t> </a:t>
+            </a:r>
+            <a:r>
+              <a:rPr lang="de-DE" dirty="0" err="1"/>
+              <a:t>function</a:t>
+            </a:r>
+            <a:endParaRPr lang="de-DE" dirty="0"/>
+          </a:p>
+          <a:p>
+            <a:r>
+              <a:rPr lang="de-DE" dirty="0"/>
+              <a:t>Plot </a:t>
+            </a:r>
+            <a:r>
+              <a:rPr lang="de-DE" dirty="0" err="1"/>
+              <a:t>function</a:t>
+            </a:r>
+            <a:r>
+              <a:rPr lang="de-DE" dirty="0"/>
+              <a:t> (</a:t>
+            </a:r>
+            <a:r>
+              <a:rPr lang="de-DE" dirty="0" err="1"/>
+              <a:t>subplots</a:t>
+            </a:r>
+            <a:r>
+              <a:rPr lang="de-DE" dirty="0"/>
+              <a:t>)</a:t>
+            </a:r>
+          </a:p>
+          <a:p>
+            <a:r>
+              <a:rPr lang="de-DE" dirty="0" err="1"/>
+              <a:t>write</a:t>
+            </a:r>
+            <a:r>
+              <a:rPr lang="de-DE" dirty="0"/>
+              <a:t> </a:t>
+            </a:r>
+            <a:r>
+              <a:rPr lang="de-DE" dirty="0" err="1"/>
+              <a:t>output</a:t>
+            </a:r>
+            <a:r>
+              <a:rPr lang="de-DE" dirty="0"/>
+              <a:t> </a:t>
+            </a:r>
+            <a:r>
+              <a:rPr lang="de-DE" dirty="0" err="1"/>
+              <a:t>function</a:t>
+            </a:r>
+            <a:endParaRPr lang="de-DE" dirty="0"/>
+          </a:p>
+        </p:txBody>
+      </p:sp>
+      <p:sp>
+        <p:nvSpPr>
+          <p:cNvPr id="4" name="Textfeld 3">
+            <a:extLst>
+              <a:ext uri="{FF2B5EF4-FFF2-40B4-BE49-F238E27FC236}">
+                <a16:creationId xmlns:a16="http://schemas.microsoft.com/office/drawing/2014/main" id="{D08601A4-46F3-4588-AF2E-0789D38798D8}"/>
+              </a:ext>
+            </a:extLst>
+          </p:cNvPr>
+          <p:cNvSpPr txBox="1"/>
+          <p:nvPr/>
+        </p:nvSpPr>
+        <p:spPr>
+          <a:xfrm>
+            <a:off x="771787" y="3951215"/>
+            <a:ext cx="5724644" cy="2308324"/>
+          </a:xfrm>
+          <a:prstGeom prst="rect">
+            <a:avLst/>
+          </a:prstGeom>
+          <a:noFill/>
+        </p:spPr>
+        <p:txBody>
+          <a:bodyPr wrap="none" rtlCol="0">
+            <a:spAutoFit/>
+          </a:bodyPr>
+          <a:lstStyle/>
+          <a:p>
+            <a:r>
+              <a:rPr lang="de-DE" dirty="0"/>
+              <a:t>Statistical Class</a:t>
+            </a:r>
+          </a:p>
+          <a:p>
+            <a:endParaRPr lang="de-DE" dirty="0"/>
+          </a:p>
+          <a:p>
+            <a:r>
+              <a:rPr lang="de-DE" dirty="0"/>
+              <a:t>	</a:t>
+            </a:r>
+            <a:r>
+              <a:rPr lang="de-DE" dirty="0">
+                <a:solidFill>
+                  <a:schemeClr val="accent2"/>
+                </a:solidFill>
+              </a:rPr>
+              <a:t> </a:t>
+            </a:r>
+            <a:r>
+              <a:rPr lang="de-DE" dirty="0" err="1">
+                <a:solidFill>
+                  <a:schemeClr val="accent2"/>
+                </a:solidFill>
+              </a:rPr>
+              <a:t>corr</a:t>
+            </a:r>
+            <a:r>
+              <a:rPr lang="de-DE" dirty="0">
+                <a:solidFill>
+                  <a:schemeClr val="accent2"/>
+                </a:solidFill>
+              </a:rPr>
+              <a:t> </a:t>
+            </a:r>
+            <a:r>
+              <a:rPr lang="de-DE" dirty="0" err="1">
+                <a:solidFill>
+                  <a:schemeClr val="accent2"/>
+                </a:solidFill>
+              </a:rPr>
+              <a:t>fucntion</a:t>
+            </a:r>
+            <a:r>
+              <a:rPr lang="de-DE" dirty="0">
+                <a:solidFill>
+                  <a:schemeClr val="accent2"/>
+                </a:solidFill>
+              </a:rPr>
+              <a:t> 	-&gt; 	</a:t>
+            </a:r>
+            <a:r>
+              <a:rPr lang="de-DE" dirty="0" err="1">
+                <a:solidFill>
+                  <a:schemeClr val="accent2"/>
+                </a:solidFill>
+              </a:rPr>
+              <a:t>correlation</a:t>
+            </a:r>
+            <a:r>
+              <a:rPr lang="de-DE" dirty="0">
+                <a:solidFill>
+                  <a:schemeClr val="accent2"/>
+                </a:solidFill>
+              </a:rPr>
+              <a:t> </a:t>
+            </a:r>
+            <a:r>
+              <a:rPr lang="de-DE" dirty="0" err="1">
+                <a:solidFill>
+                  <a:schemeClr val="accent2"/>
+                </a:solidFill>
+              </a:rPr>
+              <a:t>matrix</a:t>
+            </a:r>
+            <a:endParaRPr lang="de-DE" dirty="0">
+              <a:solidFill>
+                <a:schemeClr val="accent2"/>
+              </a:solidFill>
+            </a:endParaRPr>
+          </a:p>
+          <a:p>
+            <a:r>
+              <a:rPr lang="de-DE" dirty="0">
+                <a:solidFill>
+                  <a:schemeClr val="accent2"/>
+                </a:solidFill>
+              </a:rPr>
+              <a:t>				</a:t>
+            </a:r>
+            <a:r>
+              <a:rPr lang="de-DE" dirty="0" err="1">
+                <a:solidFill>
+                  <a:schemeClr val="accent2"/>
+                </a:solidFill>
+              </a:rPr>
+              <a:t>seaborn</a:t>
+            </a:r>
+            <a:endParaRPr lang="de-DE" dirty="0">
+              <a:solidFill>
+                <a:schemeClr val="accent2"/>
+              </a:solidFill>
+            </a:endParaRPr>
+          </a:p>
+          <a:p>
+            <a:endParaRPr lang="de-DE" dirty="0">
+              <a:solidFill>
+                <a:schemeClr val="accent2"/>
+              </a:solidFill>
+            </a:endParaRPr>
+          </a:p>
+          <a:p>
+            <a:r>
+              <a:rPr lang="de-DE" dirty="0">
+                <a:solidFill>
+                  <a:schemeClr val="accent2"/>
+                </a:solidFill>
+              </a:rPr>
+              <a:t>	norm 		-&gt;	</a:t>
+            </a:r>
+            <a:r>
+              <a:rPr lang="de-DE" dirty="0" err="1">
+                <a:solidFill>
+                  <a:schemeClr val="accent2"/>
+                </a:solidFill>
+              </a:rPr>
+              <a:t>calculate</a:t>
+            </a:r>
+            <a:r>
+              <a:rPr lang="de-DE" dirty="0">
+                <a:solidFill>
+                  <a:schemeClr val="accent2"/>
+                </a:solidFill>
+              </a:rPr>
+              <a:t> norm	</a:t>
+            </a:r>
+            <a:endParaRPr lang="de-DE" dirty="0"/>
+          </a:p>
+          <a:p>
+            <a:endParaRPr lang="de-DE" dirty="0"/>
+          </a:p>
+          <a:p>
+            <a:endParaRPr lang="de-DE" dirty="0"/>
+          </a:p>
+        </p:txBody>
+      </p:sp>
+    </p:spTree>
+    <p:extLst>
+      <p:ext uri="{BB962C8B-B14F-4D97-AF65-F5344CB8AC3E}">
+        <p14:creationId xmlns:p14="http://schemas.microsoft.com/office/powerpoint/2010/main" val="3872315283"/>
       </p:ext>
     </p:extLst>
   </p:cSld>

</xml_diff>